<commit_message>
Module 1 dry run changes complete
</commit_message>
<xml_diff>
--- a/Complimentary Course Content/Module1/Lessons/Module1_Lesson3 Services in Azure.pptx
+++ b/Complimentary Course Content/Module1/Lessons/Module1_Lesson3 Services in Azure.pptx
@@ -162,7 +162,7 @@
       </p14:sectionLst>
     </p:ext>
     <p:ext uri="{EFAFB233-063F-42B5-8137-9DF3F51BA10A}">
-      <p15:sldGuideLst xmlns:p15="http://schemas.microsoft.com/office/powerpoint/2012/main" xmlns="">
+      <p15:sldGuideLst xmlns="" xmlns:p15="http://schemas.microsoft.com/office/powerpoint/2012/main">
         <p15:guide id="1" orient="horz" pos="2160">
           <p15:clr>
             <a:srgbClr val="A4A3A4"/>
@@ -269,7 +269,7 @@
             <a:fld id="{2E5CA586-3557-4985-BCD4-35EF5AC8B4A4}" type="datetimeFigureOut">
               <a:rPr lang="en-US" smtClean="0"/>
               <a:pPr/>
-              <a:t>6/22/16</a:t>
+              <a:t>7/1/16</a:t>
             </a:fld>
             <a:endParaRPr lang="en-US"/>
           </a:p>
@@ -25417,7 +25417,7 @@
                 <a:latin typeface="Segoe UI"/>
               </a:rPr>
               <a:pPr/>
-              <a:t>6/22/16</a:t>
+              <a:t>7/1/16</a:t>
             </a:fld>
             <a:endParaRPr lang="en-US">
               <a:solidFill>
@@ -25622,7 +25622,7 @@
                 <a:latin typeface="Segoe UI"/>
               </a:rPr>
               <a:pPr/>
-              <a:t>6/22/16</a:t>
+              <a:t>7/1/16</a:t>
             </a:fld>
             <a:endParaRPr lang="en-US">
               <a:solidFill>
@@ -25920,7 +25920,7 @@
                 <a:latin typeface="Segoe UI"/>
               </a:rPr>
               <a:pPr/>
-              <a:t>6/22/16</a:t>
+              <a:t>7/1/16</a:t>
             </a:fld>
             <a:endParaRPr lang="en-US">
               <a:solidFill>
@@ -26264,7 +26264,7 @@
                 <a:latin typeface="Segoe UI"/>
               </a:rPr>
               <a:pPr/>
-              <a:t>6/22/16</a:t>
+              <a:t>7/1/16</a:t>
             </a:fld>
             <a:endParaRPr lang="en-US">
               <a:solidFill>
@@ -26639,7 +26639,7 @@
                 <a:latin typeface="Segoe UI"/>
               </a:rPr>
               <a:pPr/>
-              <a:t>6/22/16</a:t>
+              <a:t>7/1/16</a:t>
             </a:fld>
             <a:endParaRPr lang="en-US">
               <a:solidFill>
@@ -28146,7 +28146,7 @@
                 <a:latin typeface="Segoe UI"/>
               </a:rPr>
               <a:pPr/>
-              <a:t>6/22/16</a:t>
+              <a:t>7/1/16</a:t>
             </a:fld>
             <a:endParaRPr lang="en-US">
               <a:solidFill>
@@ -28547,7 +28547,7 @@
                 <a:latin typeface="Segoe UI"/>
               </a:rPr>
               <a:pPr/>
-              <a:t>6/22/16</a:t>
+              <a:t>7/1/16</a:t>
             </a:fld>
             <a:endParaRPr lang="en-US">
               <a:solidFill>
@@ -28701,7 +28701,7 @@
                 <a:latin typeface="Segoe UI"/>
               </a:rPr>
               <a:pPr/>
-              <a:t>6/22/16</a:t>
+              <a:t>7/1/16</a:t>
             </a:fld>
             <a:endParaRPr lang="en-US">
               <a:solidFill>
@@ -28833,7 +28833,7 @@
                 <a:latin typeface="Segoe UI"/>
               </a:rPr>
               <a:pPr/>
-              <a:t>6/22/16</a:t>
+              <a:t>7/1/16</a:t>
             </a:fld>
             <a:endParaRPr lang="en-US">
               <a:solidFill>
@@ -29145,7 +29145,7 @@
                 <a:latin typeface="Segoe UI"/>
               </a:rPr>
               <a:pPr/>
-              <a:t>6/22/16</a:t>
+              <a:t>7/1/16</a:t>
             </a:fld>
             <a:endParaRPr lang="en-US">
               <a:solidFill>
@@ -29434,7 +29434,7 @@
                 <a:latin typeface="Segoe UI"/>
               </a:rPr>
               <a:pPr/>
-              <a:t>6/22/16</a:t>
+              <a:t>7/1/16</a:t>
             </a:fld>
             <a:endParaRPr lang="en-US">
               <a:solidFill>
@@ -29639,7 +29639,7 @@
                 <a:latin typeface="Segoe UI"/>
               </a:rPr>
               <a:pPr/>
-              <a:t>6/22/16</a:t>
+              <a:t>7/1/16</a:t>
             </a:fld>
             <a:endParaRPr lang="en-US">
               <a:solidFill>
@@ -29854,7 +29854,7 @@
                 <a:latin typeface="Segoe UI"/>
               </a:rPr>
               <a:pPr/>
-              <a:t>6/22/16</a:t>
+              <a:t>7/1/16</a:t>
             </a:fld>
             <a:endParaRPr lang="en-US">
               <a:solidFill>
@@ -31903,7 +31903,7 @@
                 <a:latin typeface="Segoe UI"/>
               </a:rPr>
               <a:pPr/>
-              <a:t>6/22/16</a:t>
+              <a:t>7/1/16</a:t>
             </a:fld>
             <a:endParaRPr lang="en-US">
               <a:solidFill>
@@ -36610,14 +36610,14 @@
                 <a:gridCol w="2975042">
                   <a:extLst>
                     <a:ext uri="{9D8B030D-6E8A-4147-A177-3AD203B41FA5}">
-                      <a16:colId xmlns:a16="http://schemas.microsoft.com/office/drawing/2014/main" xmlns="" val="48614039"/>
+                      <a16:colId xmlns="" xmlns:a16="http://schemas.microsoft.com/office/drawing/2014/main" val="48614039"/>
                     </a:ext>
                   </a:extLst>
                 </a:gridCol>
                 <a:gridCol w="7859948">
                   <a:extLst>
                     <a:ext uri="{9D8B030D-6E8A-4147-A177-3AD203B41FA5}">
-                      <a16:colId xmlns:a16="http://schemas.microsoft.com/office/drawing/2014/main" xmlns="" val="20001"/>
+                      <a16:colId xmlns="" xmlns:a16="http://schemas.microsoft.com/office/drawing/2014/main" val="20001"/>
                     </a:ext>
                   </a:extLst>
                 </a:gridCol>
@@ -36669,7 +36669,7 @@
                 </a:tc>
                 <a:extLst>
                   <a:ext uri="{0D108BD9-81ED-4DB2-BD59-A6C34878D82A}">
-                    <a16:rowId xmlns:a16="http://schemas.microsoft.com/office/drawing/2014/main" xmlns="" val="679667022"/>
+                    <a16:rowId xmlns="" xmlns:a16="http://schemas.microsoft.com/office/drawing/2014/main" val="679667022"/>
                   </a:ext>
                 </a:extLst>
               </a:tr>
@@ -36736,7 +36736,7 @@
                 </a:tc>
                 <a:extLst>
                   <a:ext uri="{0D108BD9-81ED-4DB2-BD59-A6C34878D82A}">
-                    <a16:rowId xmlns:a16="http://schemas.microsoft.com/office/drawing/2014/main" xmlns="" val="2034482246"/>
+                    <a16:rowId xmlns="" xmlns:a16="http://schemas.microsoft.com/office/drawing/2014/main" val="2034482246"/>
                   </a:ext>
                 </a:extLst>
               </a:tr>
@@ -36783,7 +36783,7 @@
                 </a:tc>
                 <a:extLst>
                   <a:ext uri="{0D108BD9-81ED-4DB2-BD59-A6C34878D82A}">
-                    <a16:rowId xmlns:a16="http://schemas.microsoft.com/office/drawing/2014/main" xmlns="" val="10002"/>
+                    <a16:rowId xmlns="" xmlns:a16="http://schemas.microsoft.com/office/drawing/2014/main" val="10002"/>
                   </a:ext>
                 </a:extLst>
               </a:tr>
@@ -36847,7 +36847,7 @@
                 </a:tc>
                 <a:extLst>
                   <a:ext uri="{0D108BD9-81ED-4DB2-BD59-A6C34878D82A}">
-                    <a16:rowId xmlns:a16="http://schemas.microsoft.com/office/drawing/2014/main" xmlns="" val="10003"/>
+                    <a16:rowId xmlns="" xmlns:a16="http://schemas.microsoft.com/office/drawing/2014/main" val="10003"/>
                   </a:ext>
                 </a:extLst>
               </a:tr>
@@ -37205,28 +37205,28 @@
                 <a:gridCol w="3112851">
                   <a:extLst>
                     <a:ext uri="{9D8B030D-6E8A-4147-A177-3AD203B41FA5}">
-                      <a16:colId xmlns:a16="http://schemas.microsoft.com/office/drawing/2014/main" xmlns="" val="48614039"/>
+                      <a16:colId xmlns="" xmlns:a16="http://schemas.microsoft.com/office/drawing/2014/main" val="48614039"/>
                     </a:ext>
                   </a:extLst>
                 </a:gridCol>
                 <a:gridCol w="2480553">
                   <a:extLst>
                     <a:ext uri="{9D8B030D-6E8A-4147-A177-3AD203B41FA5}">
-                      <a16:colId xmlns:a16="http://schemas.microsoft.com/office/drawing/2014/main" xmlns="" val="20001"/>
+                      <a16:colId xmlns="" xmlns:a16="http://schemas.microsoft.com/office/drawing/2014/main" val="20001"/>
                     </a:ext>
                   </a:extLst>
                 </a:gridCol>
                 <a:gridCol w="2796702">
                   <a:extLst>
                     <a:ext uri="{9D8B030D-6E8A-4147-A177-3AD203B41FA5}">
-                      <a16:colId xmlns:a16="http://schemas.microsoft.com/office/drawing/2014/main" xmlns="" val="20002"/>
+                      <a16:colId xmlns="" xmlns:a16="http://schemas.microsoft.com/office/drawing/2014/main" val="20002"/>
                     </a:ext>
                   </a:extLst>
                 </a:gridCol>
                 <a:gridCol w="2796702">
                   <a:extLst>
                     <a:ext uri="{9D8B030D-6E8A-4147-A177-3AD203B41FA5}">
-                      <a16:colId xmlns:a16="http://schemas.microsoft.com/office/drawing/2014/main" xmlns="" val="1124546490"/>
+                      <a16:colId xmlns="" xmlns:a16="http://schemas.microsoft.com/office/drawing/2014/main" val="1124546490"/>
                     </a:ext>
                   </a:extLst>
                 </a:gridCol>
@@ -37351,7 +37351,7 @@
                 </a:tc>
                 <a:extLst>
                   <a:ext uri="{0D108BD9-81ED-4DB2-BD59-A6C34878D82A}">
-                    <a16:rowId xmlns:a16="http://schemas.microsoft.com/office/drawing/2014/main" xmlns="" val="679667022"/>
+                    <a16:rowId xmlns="" xmlns:a16="http://schemas.microsoft.com/office/drawing/2014/main" val="679667022"/>
                   </a:ext>
                 </a:extLst>
               </a:tr>
@@ -37604,7 +37604,7 @@
                 </a:tc>
                 <a:extLst>
                   <a:ext uri="{0D108BD9-81ED-4DB2-BD59-A6C34878D82A}">
-                    <a16:rowId xmlns:a16="http://schemas.microsoft.com/office/drawing/2014/main" xmlns="" val="2034482246"/>
+                    <a16:rowId xmlns="" xmlns:a16="http://schemas.microsoft.com/office/drawing/2014/main" val="2034482246"/>
                   </a:ext>
                 </a:extLst>
               </a:tr>
@@ -37966,28 +37966,28 @@
                 <a:gridCol w="2782110">
                   <a:extLst>
                     <a:ext uri="{9D8B030D-6E8A-4147-A177-3AD203B41FA5}">
-                      <a16:colId xmlns:a16="http://schemas.microsoft.com/office/drawing/2014/main" xmlns="" val="48614039"/>
+                      <a16:colId xmlns="" xmlns:a16="http://schemas.microsoft.com/office/drawing/2014/main" val="48614039"/>
                     </a:ext>
                   </a:extLst>
                 </a:gridCol>
                 <a:gridCol w="2782110">
                   <a:extLst>
                     <a:ext uri="{9D8B030D-6E8A-4147-A177-3AD203B41FA5}">
-                      <a16:colId xmlns:a16="http://schemas.microsoft.com/office/drawing/2014/main" xmlns="" val="20001"/>
+                      <a16:colId xmlns="" xmlns:a16="http://schemas.microsoft.com/office/drawing/2014/main" val="20001"/>
                     </a:ext>
                   </a:extLst>
                 </a:gridCol>
                 <a:gridCol w="2782110">
                   <a:extLst>
                     <a:ext uri="{9D8B030D-6E8A-4147-A177-3AD203B41FA5}">
-                      <a16:colId xmlns:a16="http://schemas.microsoft.com/office/drawing/2014/main" xmlns="" val="20002"/>
+                      <a16:colId xmlns="" xmlns:a16="http://schemas.microsoft.com/office/drawing/2014/main" val="20002"/>
                     </a:ext>
                   </a:extLst>
                 </a:gridCol>
                 <a:gridCol w="2782110">
                   <a:extLst>
                     <a:ext uri="{9D8B030D-6E8A-4147-A177-3AD203B41FA5}">
-                      <a16:colId xmlns:a16="http://schemas.microsoft.com/office/drawing/2014/main" xmlns="" val="1124546490"/>
+                      <a16:colId xmlns="" xmlns:a16="http://schemas.microsoft.com/office/drawing/2014/main" val="1124546490"/>
                     </a:ext>
                   </a:extLst>
                 </a:gridCol>
@@ -38096,7 +38096,7 @@
                 </a:tc>
                 <a:extLst>
                   <a:ext uri="{0D108BD9-81ED-4DB2-BD59-A6C34878D82A}">
-                    <a16:rowId xmlns:a16="http://schemas.microsoft.com/office/drawing/2014/main" xmlns="" val="679667022"/>
+                    <a16:rowId xmlns="" xmlns:a16="http://schemas.microsoft.com/office/drawing/2014/main" val="679667022"/>
                   </a:ext>
                 </a:extLst>
               </a:tr>
@@ -38275,7 +38275,7 @@
                 </a:tc>
                 <a:extLst>
                   <a:ext uri="{0D108BD9-81ED-4DB2-BD59-A6C34878D82A}">
-                    <a16:rowId xmlns:a16="http://schemas.microsoft.com/office/drawing/2014/main" xmlns="" val="2034482246"/>
+                    <a16:rowId xmlns="" xmlns:a16="http://schemas.microsoft.com/office/drawing/2014/main" val="2034482246"/>
                   </a:ext>
                 </a:extLst>
               </a:tr>
@@ -38637,28 +38637,28 @@
                 <a:gridCol w="3307406">
                   <a:extLst>
                     <a:ext uri="{9D8B030D-6E8A-4147-A177-3AD203B41FA5}">
-                      <a16:colId xmlns:a16="http://schemas.microsoft.com/office/drawing/2014/main" xmlns="" val="48614039"/>
+                      <a16:colId xmlns="" xmlns:a16="http://schemas.microsoft.com/office/drawing/2014/main" val="48614039"/>
                     </a:ext>
                   </a:extLst>
                 </a:gridCol>
                 <a:gridCol w="2704289">
                   <a:extLst>
                     <a:ext uri="{9D8B030D-6E8A-4147-A177-3AD203B41FA5}">
-                      <a16:colId xmlns:a16="http://schemas.microsoft.com/office/drawing/2014/main" xmlns="" val="20001"/>
+                      <a16:colId xmlns="" xmlns:a16="http://schemas.microsoft.com/office/drawing/2014/main" val="20001"/>
                     </a:ext>
                   </a:extLst>
                 </a:gridCol>
                 <a:gridCol w="2422187">
                   <a:extLst>
                     <a:ext uri="{9D8B030D-6E8A-4147-A177-3AD203B41FA5}">
-                      <a16:colId xmlns:a16="http://schemas.microsoft.com/office/drawing/2014/main" xmlns="" val="20002"/>
+                      <a16:colId xmlns="" xmlns:a16="http://schemas.microsoft.com/office/drawing/2014/main" val="20002"/>
                     </a:ext>
                   </a:extLst>
                 </a:gridCol>
                 <a:gridCol w="2811294">
                   <a:extLst>
                     <a:ext uri="{9D8B030D-6E8A-4147-A177-3AD203B41FA5}">
-                      <a16:colId xmlns:a16="http://schemas.microsoft.com/office/drawing/2014/main" xmlns="" val="1124546490"/>
+                      <a16:colId xmlns="" xmlns:a16="http://schemas.microsoft.com/office/drawing/2014/main" val="1124546490"/>
                     </a:ext>
                   </a:extLst>
                 </a:gridCol>
@@ -38754,7 +38754,7 @@
                 </a:tc>
                 <a:extLst>
                   <a:ext uri="{0D108BD9-81ED-4DB2-BD59-A6C34878D82A}">
-                    <a16:rowId xmlns:a16="http://schemas.microsoft.com/office/drawing/2014/main" xmlns="" val="679667022"/>
+                    <a16:rowId xmlns="" xmlns:a16="http://schemas.microsoft.com/office/drawing/2014/main" val="679667022"/>
                   </a:ext>
                 </a:extLst>
               </a:tr>
@@ -38943,7 +38943,7 @@
                 </a:tc>
                 <a:extLst>
                   <a:ext uri="{0D108BD9-81ED-4DB2-BD59-A6C34878D82A}">
-                    <a16:rowId xmlns:a16="http://schemas.microsoft.com/office/drawing/2014/main" xmlns="" val="2034482246"/>
+                    <a16:rowId xmlns="" xmlns:a16="http://schemas.microsoft.com/office/drawing/2014/main" val="2034482246"/>
                   </a:ext>
                 </a:extLst>
               </a:tr>
@@ -39401,21 +39401,21 @@
                 <a:gridCol w="1533180">
                   <a:extLst>
                     <a:ext uri="{9D8B030D-6E8A-4147-A177-3AD203B41FA5}">
-                      <a16:colId xmlns:a16="http://schemas.microsoft.com/office/drawing/2014/main" xmlns="" val="20000"/>
+                      <a16:colId xmlns="" xmlns:a16="http://schemas.microsoft.com/office/drawing/2014/main" val="20000"/>
                     </a:ext>
                   </a:extLst>
                 </a:gridCol>
                 <a:gridCol w="5542869">
                   <a:extLst>
                     <a:ext uri="{9D8B030D-6E8A-4147-A177-3AD203B41FA5}">
-                      <a16:colId xmlns:a16="http://schemas.microsoft.com/office/drawing/2014/main" xmlns="" val="20001"/>
+                      <a16:colId xmlns="" xmlns:a16="http://schemas.microsoft.com/office/drawing/2014/main" val="20001"/>
                     </a:ext>
                   </a:extLst>
                 </a:gridCol>
                 <a:gridCol w="4149970">
                   <a:extLst>
                     <a:ext uri="{9D8B030D-6E8A-4147-A177-3AD203B41FA5}">
-                      <a16:colId xmlns:a16="http://schemas.microsoft.com/office/drawing/2014/main" xmlns="" val="20002"/>
+                      <a16:colId xmlns="" xmlns:a16="http://schemas.microsoft.com/office/drawing/2014/main" val="20002"/>
                     </a:ext>
                   </a:extLst>
                 </a:gridCol>
@@ -39496,7 +39496,7 @@
                 </a:tc>
                 <a:extLst>
                   <a:ext uri="{0D108BD9-81ED-4DB2-BD59-A6C34878D82A}">
-                    <a16:rowId xmlns:a16="http://schemas.microsoft.com/office/drawing/2014/main" xmlns="" val="10000"/>
+                    <a16:rowId xmlns="" xmlns:a16="http://schemas.microsoft.com/office/drawing/2014/main" val="10000"/>
                   </a:ext>
                 </a:extLst>
               </a:tr>
@@ -39575,7 +39575,7 @@
                 </a:tc>
                 <a:extLst>
                   <a:ext uri="{0D108BD9-81ED-4DB2-BD59-A6C34878D82A}">
-                    <a16:rowId xmlns:a16="http://schemas.microsoft.com/office/drawing/2014/main" xmlns="" val="10001"/>
+                    <a16:rowId xmlns="" xmlns:a16="http://schemas.microsoft.com/office/drawing/2014/main" val="10001"/>
                   </a:ext>
                 </a:extLst>
               </a:tr>
@@ -39675,7 +39675,7 @@
                 </a:tc>
                 <a:extLst>
                   <a:ext uri="{0D108BD9-81ED-4DB2-BD59-A6C34878D82A}">
-                    <a16:rowId xmlns:a16="http://schemas.microsoft.com/office/drawing/2014/main" xmlns="" val="10002"/>
+                    <a16:rowId xmlns="" xmlns:a16="http://schemas.microsoft.com/office/drawing/2014/main" val="10002"/>
                   </a:ext>
                 </a:extLst>
               </a:tr>
@@ -39764,7 +39764,7 @@
                 </a:tc>
                 <a:extLst>
                   <a:ext uri="{0D108BD9-81ED-4DB2-BD59-A6C34878D82A}">
-                    <a16:rowId xmlns:a16="http://schemas.microsoft.com/office/drawing/2014/main" xmlns="" val="10003"/>
+                    <a16:rowId xmlns="" xmlns:a16="http://schemas.microsoft.com/office/drawing/2014/main" val="10003"/>
                   </a:ext>
                 </a:extLst>
               </a:tr>
@@ -39832,7 +39832,7 @@
                 </a:tc>
                 <a:extLst>
                   <a:ext uri="{0D108BD9-81ED-4DB2-BD59-A6C34878D82A}">
-                    <a16:rowId xmlns:a16="http://schemas.microsoft.com/office/drawing/2014/main" xmlns="" val="10004"/>
+                    <a16:rowId xmlns="" xmlns:a16="http://schemas.microsoft.com/office/drawing/2014/main" val="10004"/>
                   </a:ext>
                 </a:extLst>
               </a:tr>
@@ -39911,7 +39911,7 @@
                 </a:tc>
                 <a:extLst>
                   <a:ext uri="{0D108BD9-81ED-4DB2-BD59-A6C34878D82A}">
-                    <a16:rowId xmlns:a16="http://schemas.microsoft.com/office/drawing/2014/main" xmlns="" val="10005"/>
+                    <a16:rowId xmlns="" xmlns:a16="http://schemas.microsoft.com/office/drawing/2014/main" val="10005"/>
                   </a:ext>
                 </a:extLst>
               </a:tr>
@@ -39979,7 +39979,7 @@
                 </a:tc>
                 <a:extLst>
                   <a:ext uri="{0D108BD9-81ED-4DB2-BD59-A6C34878D82A}">
-                    <a16:rowId xmlns:a16="http://schemas.microsoft.com/office/drawing/2014/main" xmlns="" val="10006"/>
+                    <a16:rowId xmlns="" xmlns:a16="http://schemas.microsoft.com/office/drawing/2014/main" val="10006"/>
                   </a:ext>
                 </a:extLst>
               </a:tr>
@@ -42462,8 +42462,13 @@
               <a:pPr algn="l"/>
               <a:r>
                 <a:rPr lang="en-US" altLang="ko-KR" i="0" dirty="0"/>
-                <a:t>Azure is a flexible, open, and secure public cloud built for business. </a:t>
+                <a:t>Azure is a flexible, open, and secure </a:t>
               </a:r>
+              <a:r>
+                <a:rPr lang="en-US" altLang="ko-KR" i="0" dirty="0" smtClean="0"/>
+                <a:t>public and hybrid cloud </a:t>
+              </a:r>
+              <a:endParaRPr lang="en-US" altLang="ko-KR" i="0" dirty="0"/>
             </a:p>
           </p:txBody>
         </p:sp>
@@ -47462,28 +47467,28 @@
                 <a:gridCol w="208280">
                   <a:extLst>
                     <a:ext uri="{9D8B030D-6E8A-4147-A177-3AD203B41FA5}">
-                      <a16:colId xmlns:a16="http://schemas.microsoft.com/office/drawing/2014/main" xmlns="" val="48614039"/>
+                      <a16:colId xmlns="" xmlns:a16="http://schemas.microsoft.com/office/drawing/2014/main" val="48614039"/>
                     </a:ext>
                   </a:extLst>
                 </a:gridCol>
                 <a:gridCol w="208280">
                   <a:extLst>
                     <a:ext uri="{9D8B030D-6E8A-4147-A177-3AD203B41FA5}">
-                      <a16:colId xmlns:a16="http://schemas.microsoft.com/office/drawing/2014/main" xmlns="" val="1124546490"/>
+                      <a16:colId xmlns="" xmlns:a16="http://schemas.microsoft.com/office/drawing/2014/main" val="1124546490"/>
                     </a:ext>
                   </a:extLst>
                 </a:gridCol>
                 <a:gridCol w="208280">
                   <a:extLst>
                     <a:ext uri="{9D8B030D-6E8A-4147-A177-3AD203B41FA5}">
-                      <a16:colId xmlns:a16="http://schemas.microsoft.com/office/drawing/2014/main" xmlns="" val="2986980724"/>
+                      <a16:colId xmlns="" xmlns:a16="http://schemas.microsoft.com/office/drawing/2014/main" val="2986980724"/>
                     </a:ext>
                   </a:extLst>
                 </a:gridCol>
                 <a:gridCol w="208280">
                   <a:extLst>
                     <a:ext uri="{9D8B030D-6E8A-4147-A177-3AD203B41FA5}">
-                      <a16:colId xmlns:a16="http://schemas.microsoft.com/office/drawing/2014/main" xmlns="" val="20003"/>
+                      <a16:colId xmlns="" xmlns:a16="http://schemas.microsoft.com/office/drawing/2014/main" val="20003"/>
                     </a:ext>
                   </a:extLst>
                 </a:gridCol>
@@ -47567,7 +47572,7 @@
                 </a:tc>
                 <a:extLst>
                   <a:ext uri="{0D108BD9-81ED-4DB2-BD59-A6C34878D82A}">
-                    <a16:rowId xmlns:a16="http://schemas.microsoft.com/office/drawing/2014/main" xmlns="" val="679667022"/>
+                    <a16:rowId xmlns="" xmlns:a16="http://schemas.microsoft.com/office/drawing/2014/main" val="679667022"/>
                   </a:ext>
                 </a:extLst>
               </a:tr>
@@ -47638,7 +47643,7 @@
                 </a:tc>
                 <a:extLst>
                   <a:ext uri="{0D108BD9-81ED-4DB2-BD59-A6C34878D82A}">
-                    <a16:rowId xmlns:a16="http://schemas.microsoft.com/office/drawing/2014/main" xmlns="" val="2034482246"/>
+                    <a16:rowId xmlns="" xmlns:a16="http://schemas.microsoft.com/office/drawing/2014/main" val="2034482246"/>
                   </a:ext>
                 </a:extLst>
               </a:tr>
@@ -47709,7 +47714,7 @@
                 </a:tc>
                 <a:extLst>
                   <a:ext uri="{0D108BD9-81ED-4DB2-BD59-A6C34878D82A}">
-                    <a16:rowId xmlns:a16="http://schemas.microsoft.com/office/drawing/2014/main" xmlns="" val="682465758"/>
+                    <a16:rowId xmlns="" xmlns:a16="http://schemas.microsoft.com/office/drawing/2014/main" val="682465758"/>
                   </a:ext>
                 </a:extLst>
               </a:tr>
@@ -47780,7 +47785,7 @@
                 </a:tc>
                 <a:extLst>
                   <a:ext uri="{0D108BD9-81ED-4DB2-BD59-A6C34878D82A}">
-                    <a16:rowId xmlns:a16="http://schemas.microsoft.com/office/drawing/2014/main" xmlns="" val="4230228483"/>
+                    <a16:rowId xmlns="" xmlns:a16="http://schemas.microsoft.com/office/drawing/2014/main" val="4230228483"/>
                   </a:ext>
                 </a:extLst>
               </a:tr>
@@ -47852,7 +47857,7 @@
                 </a:tc>
                 <a:extLst>
                   <a:ext uri="{0D108BD9-81ED-4DB2-BD59-A6C34878D82A}">
-                    <a16:rowId xmlns:a16="http://schemas.microsoft.com/office/drawing/2014/main" xmlns="" val="3329658239"/>
+                    <a16:rowId xmlns="" xmlns:a16="http://schemas.microsoft.com/office/drawing/2014/main" val="3329658239"/>
                   </a:ext>
                 </a:extLst>
               </a:tr>
@@ -50669,7 +50674,7 @@
   <a:extraClrSchemeLst/>
   <a:extLst>
     <a:ext uri="{05A4C25C-085E-4340-85A3-A5531E510DB2}">
-      <thm15:themeFamily xmlns:thm15="http://schemas.microsoft.com/office/thememl/2012/main" xmlns="" name="Azure4ResearchTemplate" id="{DD1C6CE8-BDBA-0D4F-9930-3643ABC8EF0E}" vid="{B5C66FD7-0952-994B-96D6-AB3BB89097FE}"/>
+      <thm15:themeFamily xmlns="" xmlns:thm15="http://schemas.microsoft.com/office/thememl/2012/main" name="Azure4ResearchTemplate" id="{DD1C6CE8-BDBA-0D4F-9930-3643ABC8EF0E}" vid="{B5C66FD7-0952-994B-96D6-AB3BB89097FE}"/>
     </a:ext>
   </a:extLst>
 </a:theme>
@@ -51002,7 +51007,7 @@
   <a:extraClrSchemeLst/>
   <a:extLst>
     <a:ext uri="{05A4C25C-085E-4340-85A3-A5531E510DB2}">
-      <thm15:themeFamily xmlns:thm15="http://schemas.microsoft.com/office/thememl/2012/main" xmlns="" name="Azure4ResearchTemplate" id="{DD1C6CE8-BDBA-0D4F-9930-3643ABC8EF0E}" vid="{B5C66FD7-0952-994B-96D6-AB3BB89097FE}"/>
+      <thm15:themeFamily xmlns="" xmlns:thm15="http://schemas.microsoft.com/office/thememl/2012/main" name="Azure4ResearchTemplate" id="{DD1C6CE8-BDBA-0D4F-9930-3643ABC8EF0E}" vid="{B5C66FD7-0952-994B-96D6-AB3BB89097FE}"/>
     </a:ext>
   </a:extLst>
 </a:theme>
@@ -51271,7 +51276,7 @@
   <a:extraClrSchemeLst/>
   <a:extLst>
     <a:ext uri="{05A4C25C-085E-4340-85A3-A5531E510DB2}">
-      <thm15:themeFamily xmlns:thm15="http://schemas.microsoft.com/office/thememl/2012/main" xmlns="" name="Office Theme" id="{62F939B6-93AF-4DB8-9C6B-D6C7DFDC589F}" vid="{4A3C46E8-61CC-4603-A589-7422A47A8E4A}"/>
+      <thm15:themeFamily xmlns="" xmlns:thm15="http://schemas.microsoft.com/office/thememl/2012/main" name="Office Theme" id="{62F939B6-93AF-4DB8-9C6B-D6C7DFDC589F}" vid="{4A3C46E8-61CC-4603-A589-7422A47A8E4A}"/>
     </a:ext>
   </a:extLst>
 </a:theme>
@@ -51532,7 +51537,7 @@
   <a:extraClrSchemeLst/>
   <a:extLst>
     <a:ext uri="{05A4C25C-085E-4340-85A3-A5531E510DB2}">
-      <thm15:themeFamily xmlns:thm15="http://schemas.microsoft.com/office/thememl/2012/main" xmlns="" name="Office Theme" id="{62F939B6-93AF-4DB8-9C6B-D6C7DFDC589F}" vid="{4A3C46E8-61CC-4603-A589-7422A47A8E4A}"/>
+      <thm15:themeFamily xmlns="" xmlns:thm15="http://schemas.microsoft.com/office/thememl/2012/main" name="Office Theme" id="{62F939B6-93AF-4DB8-9C6B-D6C7DFDC589F}" vid="{4A3C46E8-61CC-4603-A589-7422A47A8E4A}"/>
     </a:ext>
   </a:extLst>
 </a:theme>

</xml_diff>